<commit_message>
Review from Donatella Castelli (CNR) – Restructure to improve narrative flow; consistency and clarification corrections; improve references to other deliverables.
</commit_message>
<xml_diff>
--- a/docs/Diagrams/DiagramsMaster.pptx
+++ b/docs/Diagrams/DiagramsMaster.pptx
@@ -223,7 +223,7 @@
           <a:p>
             <a:fld id="{E9A081FF-F69F-419C-A695-2D2842B6166D}" type="datetimeFigureOut">
               <a:rPr lang="en-GB" smtClean="0"/>
-              <a:t>22/12/2018</a:t>
+              <a:t>14/02/2019</a:t>
             </a:fld>
             <a:endParaRPr lang="en-GB"/>
           </a:p>
@@ -11050,7 +11050,7 @@
         </p:nvSpPr>
         <p:spPr>
           <a:xfrm>
-            <a:off x="51752" y="2967749"/>
+            <a:off x="90842" y="2941753"/>
             <a:ext cx="8957387" cy="2453338"/>
           </a:xfrm>
           <a:prstGeom prst="roundRect">
@@ -11374,7 +11374,7 @@
         </p:nvSpPr>
         <p:spPr>
           <a:xfrm>
-            <a:off x="2933295" y="3416470"/>
+            <a:off x="2870235" y="3416470"/>
             <a:ext cx="756139" cy="446636"/>
           </a:xfrm>
           <a:prstGeom prst="roundRect">
@@ -11428,7 +11428,7 @@
         </p:nvSpPr>
         <p:spPr>
           <a:xfrm>
-            <a:off x="1259816" y="3408136"/>
+            <a:off x="1228286" y="3408136"/>
             <a:ext cx="756139" cy="454016"/>
           </a:xfrm>
           <a:prstGeom prst="roundRect">
@@ -11482,7 +11482,7 @@
         </p:nvSpPr>
         <p:spPr>
           <a:xfrm>
-            <a:off x="2090054" y="3413927"/>
+            <a:off x="2048014" y="3413927"/>
             <a:ext cx="756139" cy="426786"/>
           </a:xfrm>
           <a:prstGeom prst="roundRect">
@@ -11879,7 +11879,7 @@
         </p:nvSpPr>
         <p:spPr>
           <a:xfrm>
-            <a:off x="3786896" y="3428884"/>
+            <a:off x="3692306" y="3428884"/>
             <a:ext cx="1258299" cy="426786"/>
           </a:xfrm>
           <a:prstGeom prst="roundRect">
@@ -11964,6 +11964,60 @@
             <a:r>
               <a:rPr lang="en-GB" sz="1000" dirty="0"/>
               <a:t>Commissions</a:t>
+            </a:r>
+          </a:p>
+        </p:txBody>
+      </p:sp>
+      <p:sp>
+        <p:nvSpPr>
+          <p:cNvPr id="22" name="Rectangle: Rounded Corners 21">
+            <a:extLst>
+              <a:ext uri="{FF2B5EF4-FFF2-40B4-BE49-F238E27FC236}">
+                <a16:creationId xmlns:a16="http://schemas.microsoft.com/office/drawing/2014/main" id="{A1E17EEB-1510-439B-9A15-36B91EBEDADE}"/>
+              </a:ext>
+            </a:extLst>
+          </p:cNvPr>
+          <p:cNvSpPr/>
+          <p:nvPr/>
+        </p:nvSpPr>
+        <p:spPr>
+          <a:xfrm>
+            <a:off x="5016537" y="3444768"/>
+            <a:ext cx="756139" cy="426786"/>
+          </a:xfrm>
+          <a:prstGeom prst="roundRect">
+            <a:avLst/>
+          </a:prstGeom>
+          <a:solidFill>
+            <a:schemeClr val="accent6">
+              <a:lumMod val="75000"/>
+            </a:schemeClr>
+          </a:solidFill>
+        </p:spPr>
+        <p:style>
+          <a:lnRef idx="2">
+            <a:schemeClr val="accent1">
+              <a:shade val="50000"/>
+            </a:schemeClr>
+          </a:lnRef>
+          <a:fillRef idx="1">
+            <a:schemeClr val="accent1"/>
+          </a:fillRef>
+          <a:effectRef idx="0">
+            <a:schemeClr val="accent1"/>
+          </a:effectRef>
+          <a:fontRef idx="minor">
+            <a:schemeClr val="lt1"/>
+          </a:fontRef>
+        </p:style>
+        <p:txBody>
+          <a:bodyPr rtlCol="0" anchor="ctr"/>
+          <a:lstStyle/>
+          <a:p>
+            <a:pPr algn="ctr"/>
+            <a:r>
+              <a:rPr lang="en-GB" sz="1200" dirty="0"/>
+              <a:t>etc</a:t>
             </a:r>
           </a:p>
         </p:txBody>
@@ -12489,6 +12543,41 @@
                                   </p:childTnLst>
                                 </p:cTn>
                               </p:par>
+                              <p:par>
+                                <p:cTn id="48" presetID="10" presetClass="entr" presetSubtype="0" fill="hold" grpId="0" nodeType="withEffect">
+                                  <p:stCondLst>
+                                    <p:cond delay="0"/>
+                                  </p:stCondLst>
+                                  <p:childTnLst>
+                                    <p:set>
+                                      <p:cBhvr>
+                                        <p:cTn id="49" dur="1" fill="hold">
+                                          <p:stCondLst>
+                                            <p:cond delay="0"/>
+                                          </p:stCondLst>
+                                        </p:cTn>
+                                        <p:tgtEl>
+                                          <p:spTgt spid="22"/>
+                                        </p:tgtEl>
+                                        <p:attrNameLst>
+                                          <p:attrName>style.visibility</p:attrName>
+                                        </p:attrNameLst>
+                                      </p:cBhvr>
+                                      <p:to>
+                                        <p:strVal val="visible"/>
+                                      </p:to>
+                                    </p:set>
+                                    <p:animEffect transition="in" filter="fade">
+                                      <p:cBhvr>
+                                        <p:cTn id="50" dur="500"/>
+                                        <p:tgtEl>
+                                          <p:spTgt spid="22"/>
+                                        </p:tgtEl>
+                                      </p:cBhvr>
+                                    </p:animEffect>
+                                  </p:childTnLst>
+                                </p:cTn>
+                              </p:par>
                             </p:childTnLst>
                           </p:cTn>
                         </p:par>
@@ -12530,6 +12619,7 @@
       <p:bldP spid="43" grpId="0" animBg="1"/>
       <p:bldP spid="44" grpId="0" animBg="1"/>
       <p:bldP spid="45" grpId="0" animBg="1"/>
+      <p:bldP spid="22" grpId="0" animBg="1"/>
     </p:bldLst>
   </p:timing>
 </p:sld>

</xml_diff>

<commit_message>
Updated policy aspects of the Governance Structure based on final version of D3.6. Updated references to relevant deliverables.
</commit_message>
<xml_diff>
--- a/docs/Diagrams/DiagramsMaster.pptx
+++ b/docs/Diagrams/DiagramsMaster.pptx
@@ -223,7 +223,7 @@
           <a:p>
             <a:fld id="{E9A081FF-F69F-419C-A695-2D2842B6166D}" type="datetimeFigureOut">
               <a:rPr lang="en-GB" smtClean="0"/>
-              <a:t>14/02/2019</a:t>
+              <a:t>20/02/2019</a:t>
             </a:fld>
             <a:endParaRPr lang="en-GB"/>
           </a:p>
@@ -12656,8 +12656,8 @@
         </p:nvSpPr>
         <p:spPr>
           <a:xfrm>
-            <a:off x="4736024" y="1054138"/>
-            <a:ext cx="4229516" cy="5287391"/>
+            <a:off x="4736024" y="756958"/>
+            <a:ext cx="4229516" cy="6101042"/>
           </a:xfrm>
           <a:prstGeom prst="roundRect">
             <a:avLst/>
@@ -12803,7 +12803,7 @@
         </p:nvSpPr>
         <p:spPr>
           <a:xfrm>
-            <a:off x="340258" y="1054138"/>
+            <a:off x="340258" y="756958"/>
             <a:ext cx="3970098" cy="886153"/>
           </a:xfrm>
           <a:prstGeom prst="roundRect">
@@ -12947,16 +12947,14 @@
         </p:nvSpPr>
         <p:spPr>
           <a:xfrm>
-            <a:off x="306173" y="2263713"/>
-            <a:ext cx="4004183" cy="4073370"/>
+            <a:off x="306173" y="1966532"/>
+            <a:ext cx="4004183" cy="4891468"/>
           </a:xfrm>
           <a:prstGeom prst="roundRect">
             <a:avLst/>
           </a:prstGeom>
           <a:solidFill>
-            <a:schemeClr val="accent5">
-              <a:lumMod val="75000"/>
-            </a:schemeClr>
+            <a:srgbClr val="507BC8"/>
           </a:solidFill>
         </p:spPr>
         <p:style>
@@ -13094,7 +13092,7 @@
         </p:nvSpPr>
         <p:spPr>
           <a:xfrm>
-            <a:off x="631319" y="2796676"/>
+            <a:off x="631319" y="2499496"/>
             <a:ext cx="3176557" cy="368234"/>
           </a:xfrm>
           <a:prstGeom prst="roundRect">
@@ -13146,7 +13144,7 @@
         </p:nvCxnSpPr>
         <p:spPr>
           <a:xfrm flipH="1">
-            <a:off x="1102656" y="3164910"/>
+            <a:off x="1102656" y="2867730"/>
             <a:ext cx="1116942" cy="486949"/>
           </a:xfrm>
           <a:prstGeom prst="line">
@@ -13190,7 +13188,7 @@
         </p:nvCxnSpPr>
         <p:spPr>
           <a:xfrm>
-            <a:off x="836321" y="4728409"/>
+            <a:off x="836321" y="4431229"/>
             <a:ext cx="3927" cy="599317"/>
           </a:xfrm>
           <a:prstGeom prst="line">
@@ -13234,7 +13232,7 @@
         </p:nvCxnSpPr>
         <p:spPr>
           <a:xfrm>
-            <a:off x="836321" y="4135768"/>
+            <a:off x="836321" y="3838588"/>
             <a:ext cx="0" cy="539092"/>
           </a:xfrm>
           <a:prstGeom prst="line">
@@ -13278,7 +13276,7 @@
         </p:nvCxnSpPr>
         <p:spPr>
           <a:xfrm flipH="1">
-            <a:off x="2122130" y="3164910"/>
+            <a:off x="2122130" y="2867730"/>
             <a:ext cx="97468" cy="538560"/>
           </a:xfrm>
           <a:prstGeom prst="line">
@@ -13319,7 +13317,7 @@
         </p:nvSpPr>
         <p:spPr>
           <a:xfrm>
-            <a:off x="4947759" y="2040210"/>
+            <a:off x="4947759" y="1743030"/>
             <a:ext cx="3806170" cy="368234"/>
           </a:xfrm>
           <a:prstGeom prst="roundRect">
@@ -13380,7 +13378,7 @@
         </p:nvSpPr>
         <p:spPr>
           <a:xfrm>
-            <a:off x="4913172" y="3658763"/>
+            <a:off x="4913172" y="3361583"/>
             <a:ext cx="1274804" cy="477175"/>
           </a:xfrm>
           <a:prstGeom prst="roundRect">
@@ -13436,8 +13434,8 @@
         </p:nvSpPr>
         <p:spPr>
           <a:xfrm>
-            <a:off x="4913171" y="4702817"/>
-            <a:ext cx="1126916" cy="600889"/>
+            <a:off x="4913171" y="4405637"/>
+            <a:ext cx="1126916" cy="747185"/>
           </a:xfrm>
           <a:prstGeom prst="roundRect">
             <a:avLst/>
@@ -13492,8 +13490,8 @@
         </p:nvSpPr>
         <p:spPr>
           <a:xfrm>
-            <a:off x="4959201" y="4748846"/>
-            <a:ext cx="1126916" cy="600889"/>
+            <a:off x="4959201" y="4451666"/>
+            <a:ext cx="1126916" cy="792177"/>
           </a:xfrm>
           <a:prstGeom prst="roundRect">
             <a:avLst/>
@@ -13548,8 +13546,8 @@
         </p:nvSpPr>
         <p:spPr>
           <a:xfrm>
-            <a:off x="5005230" y="4794875"/>
-            <a:ext cx="1126916" cy="600889"/>
+            <a:off x="5005230" y="4497695"/>
+            <a:ext cx="1126916" cy="792177"/>
           </a:xfrm>
           <a:prstGeom prst="roundRect">
             <a:avLst/>
@@ -13604,7 +13602,7 @@
         </p:nvSpPr>
         <p:spPr>
           <a:xfrm>
-            <a:off x="5051259" y="4840904"/>
+            <a:off x="5051259" y="4543724"/>
             <a:ext cx="1126916" cy="600889"/>
           </a:xfrm>
           <a:prstGeom prst="roundRect">
@@ -13660,7 +13658,7 @@
         </p:nvSpPr>
         <p:spPr>
           <a:xfrm>
-            <a:off x="6384467" y="4723530"/>
+            <a:off x="6384467" y="4426350"/>
             <a:ext cx="1126916" cy="600889"/>
           </a:xfrm>
           <a:prstGeom prst="roundRect">
@@ -13709,7 +13707,7 @@
         </p:nvSpPr>
         <p:spPr>
           <a:xfrm>
-            <a:off x="6430496" y="4769559"/>
+            <a:off x="6430496" y="4472379"/>
             <a:ext cx="1126916" cy="600889"/>
           </a:xfrm>
           <a:prstGeom prst="roundRect">
@@ -13758,7 +13756,7 @@
         </p:nvSpPr>
         <p:spPr>
           <a:xfrm>
-            <a:off x="6476525" y="4815588"/>
+            <a:off x="6476525" y="4518408"/>
             <a:ext cx="1126916" cy="600889"/>
           </a:xfrm>
           <a:prstGeom prst="roundRect">
@@ -13807,7 +13805,7 @@
         </p:nvSpPr>
         <p:spPr>
           <a:xfrm>
-            <a:off x="6522555" y="4861618"/>
+            <a:off x="6522555" y="4564438"/>
             <a:ext cx="1126916" cy="600889"/>
           </a:xfrm>
           <a:prstGeom prst="roundRect">
@@ -13856,7 +13854,7 @@
         </p:nvSpPr>
         <p:spPr>
           <a:xfrm>
-            <a:off x="501301" y="1388251"/>
+            <a:off x="501301" y="1091071"/>
             <a:ext cx="3573549" cy="368234"/>
           </a:xfrm>
           <a:prstGeom prst="roundRect">
@@ -13911,7 +13909,7 @@
         </p:nvCxnSpPr>
         <p:spPr>
           <a:xfrm>
-            <a:off x="5550574" y="4135938"/>
+            <a:off x="5550574" y="3838758"/>
             <a:ext cx="0" cy="587592"/>
           </a:xfrm>
           <a:prstGeom prst="line">
@@ -13956,7 +13954,7 @@
         </p:nvCxnSpPr>
         <p:spPr>
           <a:xfrm>
-            <a:off x="7021869" y="4149747"/>
+            <a:off x="7021869" y="3852567"/>
             <a:ext cx="64144" cy="711871"/>
           </a:xfrm>
           <a:prstGeom prst="line">
@@ -14001,7 +13999,7 @@
         </p:nvCxnSpPr>
         <p:spPr>
           <a:xfrm flipH="1">
-            <a:off x="5550574" y="2408444"/>
+            <a:off x="5550574" y="2111264"/>
             <a:ext cx="1300270" cy="1250319"/>
           </a:xfrm>
           <a:prstGeom prst="line">
@@ -14046,7 +14044,7 @@
         </p:nvCxnSpPr>
         <p:spPr>
           <a:xfrm>
-            <a:off x="6850844" y="2408444"/>
+            <a:off x="6850844" y="2111264"/>
             <a:ext cx="171026" cy="1264128"/>
           </a:xfrm>
           <a:prstGeom prst="line">
@@ -14087,7 +14085,7 @@
         </p:nvSpPr>
         <p:spPr>
           <a:xfrm flipH="1">
-            <a:off x="850067" y="3382460"/>
+            <a:off x="850067" y="3085280"/>
             <a:ext cx="4844291" cy="241160"/>
           </a:xfrm>
           <a:prstGeom prst="curvedDownArrow">
@@ -14249,7 +14247,7 @@
         </p:nvCxnSpPr>
         <p:spPr>
           <a:xfrm>
-            <a:off x="4074850" y="1572368"/>
+            <a:off x="4074850" y="1275188"/>
             <a:ext cx="872909" cy="651959"/>
           </a:xfrm>
           <a:prstGeom prst="line">
@@ -14295,7 +14293,7 @@
         </p:nvCxnSpPr>
         <p:spPr>
           <a:xfrm flipV="1">
-            <a:off x="3807876" y="2224327"/>
+            <a:off x="3807876" y="1927147"/>
             <a:ext cx="1139883" cy="756466"/>
           </a:xfrm>
           <a:prstGeom prst="line">
@@ -14337,7 +14335,7 @@
         </p:nvSpPr>
         <p:spPr>
           <a:xfrm>
-            <a:off x="5070408" y="5689286"/>
+            <a:off x="5070408" y="5392106"/>
             <a:ext cx="1044240" cy="381376"/>
           </a:xfrm>
           <a:prstGeom prst="roundRect">
@@ -14386,7 +14384,7 @@
         </p:nvSpPr>
         <p:spPr>
           <a:xfrm>
-            <a:off x="5116437" y="5735315"/>
+            <a:off x="5116437" y="5438135"/>
             <a:ext cx="1044240" cy="381376"/>
           </a:xfrm>
           <a:prstGeom prst="roundRect">
@@ -14435,7 +14433,7 @@
         </p:nvSpPr>
         <p:spPr>
           <a:xfrm>
-            <a:off x="5162466" y="5781344"/>
+            <a:off x="5162466" y="5484164"/>
             <a:ext cx="1044240" cy="381376"/>
           </a:xfrm>
           <a:prstGeom prst="roundRect">
@@ -14484,7 +14482,7 @@
         </p:nvSpPr>
         <p:spPr>
           <a:xfrm>
-            <a:off x="6252736" y="5690567"/>
+            <a:off x="6405136" y="5393387"/>
             <a:ext cx="1044240" cy="381376"/>
           </a:xfrm>
           <a:prstGeom prst="roundRect">
@@ -14533,7 +14531,7 @@
         </p:nvSpPr>
         <p:spPr>
           <a:xfrm>
-            <a:off x="6298765" y="5736596"/>
+            <a:off x="6451165" y="5439416"/>
             <a:ext cx="1044240" cy="381376"/>
           </a:xfrm>
           <a:prstGeom prst="roundRect">
@@ -14568,12 +14566,56 @@
           </a:p>
         </p:txBody>
       </p:sp>
-      <p:sp>
-        <p:nvSpPr>
-          <p:cNvPr id="117" name="Rectangle: Rounded Corners 116">
+      <p:cxnSp>
+        <p:nvCxnSpPr>
+          <p:cNvPr id="44" name="Straight Connector 43">
             <a:extLst>
               <a:ext uri="{FF2B5EF4-FFF2-40B4-BE49-F238E27FC236}">
-                <a16:creationId xmlns:a16="http://schemas.microsoft.com/office/drawing/2014/main" id="{D908BB3D-4BEF-440D-AF69-494AB578B158}"/>
+                <a16:creationId xmlns:a16="http://schemas.microsoft.com/office/drawing/2014/main" id="{E3FB3A99-C613-4994-B156-B23349C83DF1}"/>
+              </a:ext>
+            </a:extLst>
+          </p:cNvPr>
+          <p:cNvCxnSpPr>
+            <a:cxnSpLocks/>
+            <a:stCxn id="33" idx="2"/>
+          </p:cNvCxnSpPr>
+          <p:nvPr/>
+        </p:nvCxnSpPr>
+        <p:spPr>
+          <a:xfrm>
+            <a:off x="2219597" y="2867730"/>
+            <a:ext cx="1244718" cy="504142"/>
+          </a:xfrm>
+          <a:prstGeom prst="line">
+            <a:avLst/>
+          </a:prstGeom>
+          <a:ln w="25400">
+            <a:solidFill>
+              <a:schemeClr val="tx2"/>
+            </a:solidFill>
+          </a:ln>
+        </p:spPr>
+        <p:style>
+          <a:lnRef idx="1">
+            <a:schemeClr val="accent1"/>
+          </a:lnRef>
+          <a:fillRef idx="0">
+            <a:schemeClr val="accent1"/>
+          </a:fillRef>
+          <a:effectRef idx="0">
+            <a:schemeClr val="accent1"/>
+          </a:effectRef>
+          <a:fontRef idx="minor">
+            <a:schemeClr val="tx1"/>
+          </a:fontRef>
+        </p:style>
+      </p:cxnSp>
+      <p:sp>
+        <p:nvSpPr>
+          <p:cNvPr id="48" name="Rectangle: Rounded Corners 47">
+            <a:extLst>
+              <a:ext uri="{FF2B5EF4-FFF2-40B4-BE49-F238E27FC236}">
+                <a16:creationId xmlns:a16="http://schemas.microsoft.com/office/drawing/2014/main" id="{51DDB1FF-0FFB-4ED2-8170-9A5CBE006C91}"/>
               </a:ext>
             </a:extLst>
           </p:cNvPr>
@@ -14582,8 +14624,8 @@
         </p:nvSpPr>
         <p:spPr>
           <a:xfrm>
-            <a:off x="6344794" y="5782625"/>
-            <a:ext cx="1044240" cy="381376"/>
+            <a:off x="7749327" y="3362832"/>
+            <a:ext cx="1004602" cy="477175"/>
           </a:xfrm>
           <a:prstGeom prst="roundRect">
             <a:avLst/>
@@ -14611,99 +14653,6 @@
           <a:p>
             <a:pPr algn="ctr"/>
             <a:r>
-              <a:rPr lang="en-GB" sz="604" b="1" dirty="0"/>
-              <a:t>Research Community Working Groups</a:t>
-            </a:r>
-          </a:p>
-        </p:txBody>
-      </p:sp>
-      <p:cxnSp>
-        <p:nvCxnSpPr>
-          <p:cNvPr id="44" name="Straight Connector 43">
-            <a:extLst>
-              <a:ext uri="{FF2B5EF4-FFF2-40B4-BE49-F238E27FC236}">
-                <a16:creationId xmlns:a16="http://schemas.microsoft.com/office/drawing/2014/main" id="{E3FB3A99-C613-4994-B156-B23349C83DF1}"/>
-              </a:ext>
-            </a:extLst>
-          </p:cNvPr>
-          <p:cNvCxnSpPr>
-            <a:cxnSpLocks/>
-            <a:stCxn id="33" idx="2"/>
-          </p:cNvCxnSpPr>
-          <p:nvPr/>
-        </p:nvCxnSpPr>
-        <p:spPr>
-          <a:xfrm>
-            <a:off x="2219597" y="3164910"/>
-            <a:ext cx="1244718" cy="504142"/>
-          </a:xfrm>
-          <a:prstGeom prst="line">
-            <a:avLst/>
-          </a:prstGeom>
-          <a:ln w="25400">
-            <a:solidFill>
-              <a:schemeClr val="tx2"/>
-            </a:solidFill>
-          </a:ln>
-        </p:spPr>
-        <p:style>
-          <a:lnRef idx="1">
-            <a:schemeClr val="accent1"/>
-          </a:lnRef>
-          <a:fillRef idx="0">
-            <a:schemeClr val="accent1"/>
-          </a:fillRef>
-          <a:effectRef idx="0">
-            <a:schemeClr val="accent1"/>
-          </a:effectRef>
-          <a:fontRef idx="minor">
-            <a:schemeClr val="tx1"/>
-          </a:fontRef>
-        </p:style>
-      </p:cxnSp>
-      <p:sp>
-        <p:nvSpPr>
-          <p:cNvPr id="48" name="Rectangle: Rounded Corners 47">
-            <a:extLst>
-              <a:ext uri="{FF2B5EF4-FFF2-40B4-BE49-F238E27FC236}">
-                <a16:creationId xmlns:a16="http://schemas.microsoft.com/office/drawing/2014/main" id="{51DDB1FF-0FFB-4ED2-8170-9A5CBE006C91}"/>
-              </a:ext>
-            </a:extLst>
-          </p:cNvPr>
-          <p:cNvSpPr/>
-          <p:nvPr/>
-        </p:nvSpPr>
-        <p:spPr>
-          <a:xfrm>
-            <a:off x="7749327" y="3660012"/>
-            <a:ext cx="1004602" cy="477175"/>
-          </a:xfrm>
-          <a:prstGeom prst="roundRect">
-            <a:avLst/>
-          </a:prstGeom>
-        </p:spPr>
-        <p:style>
-          <a:lnRef idx="2">
-            <a:schemeClr val="accent4">
-              <a:shade val="50000"/>
-            </a:schemeClr>
-          </a:lnRef>
-          <a:fillRef idx="1">
-            <a:schemeClr val="accent4"/>
-          </a:fillRef>
-          <a:effectRef idx="0">
-            <a:schemeClr val="accent4"/>
-          </a:effectRef>
-          <a:fontRef idx="minor">
-            <a:schemeClr val="lt1"/>
-          </a:fontRef>
-        </p:style>
-        <p:txBody>
-          <a:bodyPr rtlCol="0" anchor="ctr"/>
-          <a:lstStyle/>
-          <a:p>
-            <a:pPr algn="ctr"/>
-            <a:r>
               <a:rPr lang="en-GB" sz="725" b="1" dirty="0"/>
               <a:t>Policy and Rules of Participation Oversight Committee</a:t>
             </a:r>
@@ -14728,7 +14677,7 @@
         </p:nvCxnSpPr>
         <p:spPr>
           <a:xfrm>
-            <a:off x="6850844" y="2408444"/>
+            <a:off x="6850844" y="2111264"/>
             <a:ext cx="1400784" cy="1251568"/>
           </a:xfrm>
           <a:prstGeom prst="line">
@@ -14771,7 +14720,7 @@
         </p:nvCxnSpPr>
         <p:spPr>
           <a:xfrm>
-            <a:off x="1841171" y="1681066"/>
+            <a:off x="1841171" y="1383886"/>
             <a:ext cx="0" cy="1115610"/>
           </a:xfrm>
           <a:prstGeom prst="line">
@@ -14813,7 +14762,7 @@
         </p:nvSpPr>
         <p:spPr>
           <a:xfrm flipH="1">
-            <a:off x="3493077" y="4220496"/>
+            <a:off x="3493077" y="3923316"/>
             <a:ext cx="4758547" cy="504325"/>
           </a:xfrm>
           <a:prstGeom prst="curvedUpArrow">
@@ -14882,7 +14831,7 @@
         </p:nvSpPr>
         <p:spPr>
           <a:xfrm>
-            <a:off x="7700536" y="4723530"/>
+            <a:off x="7700536" y="4426350"/>
             <a:ext cx="1126916" cy="600889"/>
           </a:xfrm>
           <a:prstGeom prst="roundRect">
@@ -14931,7 +14880,7 @@
         </p:nvSpPr>
         <p:spPr>
           <a:xfrm>
-            <a:off x="7746566" y="4769559"/>
+            <a:off x="7746566" y="4472379"/>
             <a:ext cx="1126916" cy="600889"/>
           </a:xfrm>
           <a:prstGeom prst="roundRect">
@@ -14980,7 +14929,7 @@
         </p:nvSpPr>
         <p:spPr>
           <a:xfrm>
-            <a:off x="7792595" y="4815588"/>
+            <a:off x="7792595" y="4518408"/>
             <a:ext cx="1126916" cy="600889"/>
           </a:xfrm>
           <a:prstGeom prst="roundRect">
@@ -15029,7 +14978,7 @@
         </p:nvSpPr>
         <p:spPr>
           <a:xfrm>
-            <a:off x="7838624" y="4861618"/>
+            <a:off x="7838624" y="4564438"/>
             <a:ext cx="1126916" cy="600889"/>
           </a:xfrm>
           <a:prstGeom prst="roundRect">
@@ -15080,7 +15029,7 @@
         </p:nvCxnSpPr>
         <p:spPr>
           <a:xfrm>
-            <a:off x="8264660" y="4170670"/>
+            <a:off x="8264660" y="3873490"/>
             <a:ext cx="64143" cy="587578"/>
           </a:xfrm>
           <a:prstGeom prst="line">
@@ -15121,12 +15070,15 @@
         </p:nvSpPr>
         <p:spPr>
           <a:xfrm>
-            <a:off x="380595" y="3650776"/>
+            <a:off x="380595" y="3353596"/>
             <a:ext cx="942673" cy="832447"/>
           </a:xfrm>
           <a:prstGeom prst="roundRect">
             <a:avLst/>
           </a:prstGeom>
+          <a:solidFill>
+            <a:srgbClr val="7C9CD6"/>
+          </a:solidFill>
         </p:spPr>
         <p:style>
           <a:lnRef idx="2">
@@ -15177,12 +15129,15 @@
         </p:nvSpPr>
         <p:spPr>
           <a:xfrm>
-            <a:off x="364984" y="4674860"/>
+            <a:off x="364984" y="4377680"/>
             <a:ext cx="942673" cy="511564"/>
           </a:xfrm>
           <a:prstGeom prst="roundRect">
             <a:avLst/>
           </a:prstGeom>
+          <a:solidFill>
+            <a:srgbClr val="7C9CD6"/>
+          </a:solidFill>
         </p:spPr>
         <p:style>
           <a:lnRef idx="2">
@@ -15226,12 +15181,15 @@
         </p:nvSpPr>
         <p:spPr>
           <a:xfrm>
-            <a:off x="368911" y="5327726"/>
+            <a:off x="368911" y="5030546"/>
             <a:ext cx="942673" cy="728248"/>
           </a:xfrm>
           <a:prstGeom prst="roundRect">
             <a:avLst/>
           </a:prstGeom>
+          <a:solidFill>
+            <a:srgbClr val="7C9CD6"/>
+          </a:solidFill>
         </p:spPr>
         <p:style>
           <a:lnRef idx="2">
@@ -15282,12 +15240,15 @@
         </p:nvSpPr>
         <p:spPr>
           <a:xfrm>
-            <a:off x="631319" y="2784171"/>
+            <a:off x="631319" y="2486991"/>
             <a:ext cx="3176557" cy="368234"/>
           </a:xfrm>
           <a:prstGeom prst="roundRect">
             <a:avLst/>
           </a:prstGeom>
+          <a:solidFill>
+            <a:srgbClr val="7C9CD6"/>
+          </a:solidFill>
         </p:spPr>
         <p:style>
           <a:lnRef idx="2">
@@ -15331,7 +15292,7 @@
         </p:nvSpPr>
         <p:spPr>
           <a:xfrm>
-            <a:off x="4913172" y="3646259"/>
+            <a:off x="4913172" y="3349079"/>
             <a:ext cx="1274804" cy="477175"/>
           </a:xfrm>
           <a:prstGeom prst="roundRect">
@@ -15387,7 +15348,7 @@
         </p:nvSpPr>
         <p:spPr>
           <a:xfrm>
-            <a:off x="5051259" y="4828400"/>
+            <a:off x="5051259" y="4531220"/>
             <a:ext cx="1126916" cy="827361"/>
           </a:xfrm>
           <a:prstGeom prst="roundRect">
@@ -15443,7 +15404,7 @@
         </p:nvSpPr>
         <p:spPr>
           <a:xfrm>
-            <a:off x="6522555" y="4849113"/>
+            <a:off x="6522555" y="4551933"/>
             <a:ext cx="1126916" cy="600889"/>
           </a:xfrm>
           <a:prstGeom prst="roundRect">
@@ -15492,7 +15453,7 @@
         </p:nvSpPr>
         <p:spPr>
           <a:xfrm>
-            <a:off x="5162466" y="5768840"/>
+            <a:off x="5162466" y="5471660"/>
             <a:ext cx="1044240" cy="381376"/>
           </a:xfrm>
           <a:prstGeom prst="roundRect">
@@ -15541,7 +15502,7 @@
         </p:nvSpPr>
         <p:spPr>
           <a:xfrm>
-            <a:off x="6344794" y="5770120"/>
+            <a:off x="6497194" y="5472940"/>
             <a:ext cx="1044240" cy="381376"/>
           </a:xfrm>
           <a:prstGeom prst="roundRect">
@@ -15590,7 +15551,7 @@
         </p:nvSpPr>
         <p:spPr>
           <a:xfrm>
-            <a:off x="7550355" y="5709804"/>
+            <a:off x="7778955" y="5412624"/>
             <a:ext cx="1044240" cy="381376"/>
           </a:xfrm>
           <a:prstGeom prst="roundRect">
@@ -15639,7 +15600,7 @@
         </p:nvSpPr>
         <p:spPr>
           <a:xfrm>
-            <a:off x="7596384" y="5755833"/>
+            <a:off x="7824984" y="5458653"/>
             <a:ext cx="1044240" cy="381376"/>
           </a:xfrm>
           <a:prstGeom prst="roundRect">
@@ -15688,7 +15649,7 @@
         </p:nvSpPr>
         <p:spPr>
           <a:xfrm>
-            <a:off x="7642413" y="5789357"/>
+            <a:off x="7871013" y="5492177"/>
             <a:ext cx="1044240" cy="381376"/>
           </a:xfrm>
           <a:prstGeom prst="roundRect">
@@ -15737,12 +15698,15 @@
         </p:nvSpPr>
         <p:spPr>
           <a:xfrm>
-            <a:off x="2135369" y="3692586"/>
-            <a:ext cx="696536" cy="668064"/>
+            <a:off x="1764708" y="4437674"/>
+            <a:ext cx="792339" cy="668064"/>
           </a:xfrm>
           <a:prstGeom prst="roundRect">
             <a:avLst/>
           </a:prstGeom>
+          <a:solidFill>
+            <a:srgbClr val="7C9CD6"/>
+          </a:solidFill>
         </p:spPr>
         <p:style>
           <a:lnRef idx="2">
@@ -15786,12 +15750,15 @@
         </p:nvSpPr>
         <p:spPr>
           <a:xfrm>
-            <a:off x="1433058" y="3675944"/>
+            <a:off x="1828749" y="3327812"/>
             <a:ext cx="676732" cy="668064"/>
           </a:xfrm>
           <a:prstGeom prst="roundRect">
             <a:avLst/>
           </a:prstGeom>
+          <a:solidFill>
+            <a:srgbClr val="7C9CD6"/>
+          </a:solidFill>
         </p:spPr>
         <p:style>
           <a:lnRef idx="2">
@@ -15835,12 +15802,15 @@
         </p:nvSpPr>
         <p:spPr>
           <a:xfrm>
-            <a:off x="2931520" y="3711207"/>
+            <a:off x="2931520" y="3414027"/>
             <a:ext cx="665525" cy="477175"/>
           </a:xfrm>
           <a:prstGeom prst="roundRect">
             <a:avLst/>
           </a:prstGeom>
+          <a:solidFill>
+            <a:srgbClr val="7C9CD6"/>
+          </a:solidFill>
         </p:spPr>
         <p:style>
           <a:lnRef idx="2">
@@ -15872,55 +15842,6 @@
       </p:sp>
       <p:sp>
         <p:nvSpPr>
-          <p:cNvPr id="88" name="Rectangle: Rounded Corners 87">
-            <a:extLst>
-              <a:ext uri="{FF2B5EF4-FFF2-40B4-BE49-F238E27FC236}">
-                <a16:creationId xmlns:a16="http://schemas.microsoft.com/office/drawing/2014/main" id="{8E611BB6-79E5-46CB-8873-940F8411C7CC}"/>
-              </a:ext>
-            </a:extLst>
-          </p:cNvPr>
-          <p:cNvSpPr/>
-          <p:nvPr/>
-        </p:nvSpPr>
-        <p:spPr>
-          <a:xfrm>
-            <a:off x="3633537" y="3711288"/>
-            <a:ext cx="626002" cy="539824"/>
-          </a:xfrm>
-          <a:prstGeom prst="roundRect">
-            <a:avLst/>
-          </a:prstGeom>
-        </p:spPr>
-        <p:style>
-          <a:lnRef idx="2">
-            <a:schemeClr val="accent5">
-              <a:shade val="50000"/>
-            </a:schemeClr>
-          </a:lnRef>
-          <a:fillRef idx="1">
-            <a:schemeClr val="accent5"/>
-          </a:fillRef>
-          <a:effectRef idx="0">
-            <a:schemeClr val="accent5"/>
-          </a:effectRef>
-          <a:fontRef idx="minor">
-            <a:schemeClr val="lt1"/>
-          </a:fontRef>
-        </p:style>
-        <p:txBody>
-          <a:bodyPr rtlCol="0" anchor="ctr"/>
-          <a:lstStyle/>
-          <a:p>
-            <a:pPr algn="ctr"/>
-            <a:r>
-              <a:rPr lang="en-GB" sz="725" b="1" dirty="0"/>
-              <a:t>Ethics and Legal Steering Committee</a:t>
-            </a:r>
-          </a:p>
-        </p:txBody>
-      </p:sp>
-      <p:sp>
-        <p:nvSpPr>
           <p:cNvPr id="103" name="Arrow: Curved Up 102">
             <a:extLst>
               <a:ext uri="{FF2B5EF4-FFF2-40B4-BE49-F238E27FC236}">
@@ -15933,7 +15854,7 @@
         </p:nvSpPr>
         <p:spPr>
           <a:xfrm rot="21307720" flipH="1">
-            <a:off x="2154625" y="4199963"/>
+            <a:off x="2154625" y="3902783"/>
             <a:ext cx="4884719" cy="378741"/>
           </a:xfrm>
           <a:prstGeom prst="curvedUpArrow">
@@ -15997,7 +15918,7 @@
         </p:nvSpPr>
         <p:spPr>
           <a:xfrm>
-            <a:off x="6384467" y="3672572"/>
+            <a:off x="6384467" y="3375392"/>
             <a:ext cx="1274804" cy="477175"/>
           </a:xfrm>
           <a:prstGeom prst="roundRect">
@@ -16028,6 +15949,804 @@
             <a:r>
               <a:rPr lang="en-GB" sz="725" b="1" dirty="0"/>
               <a:t>Research Resource Demand Committee</a:t>
+            </a:r>
+          </a:p>
+        </p:txBody>
+      </p:sp>
+      <p:cxnSp>
+        <p:nvCxnSpPr>
+          <p:cNvPr id="68" name="Straight Connector 67">
+            <a:extLst>
+              <a:ext uri="{FF2B5EF4-FFF2-40B4-BE49-F238E27FC236}">
+                <a16:creationId xmlns:a16="http://schemas.microsoft.com/office/drawing/2014/main" id="{94C8AA8D-C0A9-4C2A-B5E0-AFC62CA60FF2}"/>
+              </a:ext>
+            </a:extLst>
+          </p:cNvPr>
+          <p:cNvCxnSpPr>
+            <a:cxnSpLocks/>
+            <a:stCxn id="63" idx="2"/>
+            <a:endCxn id="88" idx="0"/>
+          </p:cNvCxnSpPr>
+          <p:nvPr/>
+        </p:nvCxnSpPr>
+        <p:spPr>
+          <a:xfrm flipH="1">
+            <a:off x="5279101" y="2111264"/>
+            <a:ext cx="1571743" cy="282038"/>
+          </a:xfrm>
+          <a:prstGeom prst="line">
+            <a:avLst/>
+          </a:prstGeom>
+          <a:ln w="25400">
+            <a:solidFill>
+              <a:schemeClr val="tx2"/>
+            </a:solidFill>
+          </a:ln>
+        </p:spPr>
+        <p:style>
+          <a:lnRef idx="1">
+            <a:schemeClr val="accent1"/>
+          </a:lnRef>
+          <a:fillRef idx="0">
+            <a:schemeClr val="accent1"/>
+          </a:fillRef>
+          <a:effectRef idx="0">
+            <a:schemeClr val="accent1"/>
+          </a:effectRef>
+          <a:fontRef idx="minor">
+            <a:schemeClr val="tx1"/>
+          </a:fontRef>
+        </p:style>
+      </p:cxnSp>
+      <p:cxnSp>
+        <p:nvCxnSpPr>
+          <p:cNvPr id="89" name="Straight Connector 88">
+            <a:extLst>
+              <a:ext uri="{FF2B5EF4-FFF2-40B4-BE49-F238E27FC236}">
+                <a16:creationId xmlns:a16="http://schemas.microsoft.com/office/drawing/2014/main" id="{80A40649-2558-4D7A-A78D-C27B70A2B4B6}"/>
+              </a:ext>
+            </a:extLst>
+          </p:cNvPr>
+          <p:cNvCxnSpPr>
+            <a:cxnSpLocks/>
+            <a:endCxn id="94" idx="3"/>
+          </p:cNvCxnSpPr>
+          <p:nvPr/>
+        </p:nvCxnSpPr>
+        <p:spPr>
+          <a:xfrm flipH="1" flipV="1">
+            <a:off x="3807876" y="2671108"/>
+            <a:ext cx="1065739" cy="4707"/>
+          </a:xfrm>
+          <a:prstGeom prst="line">
+            <a:avLst/>
+          </a:prstGeom>
+          <a:ln w="25400">
+            <a:solidFill>
+              <a:schemeClr val="tx2"/>
+            </a:solidFill>
+          </a:ln>
+        </p:spPr>
+        <p:style>
+          <a:lnRef idx="1">
+            <a:schemeClr val="accent1"/>
+          </a:lnRef>
+          <a:fillRef idx="0">
+            <a:schemeClr val="accent1"/>
+          </a:fillRef>
+          <a:effectRef idx="0">
+            <a:schemeClr val="accent1"/>
+          </a:effectRef>
+          <a:fontRef idx="minor">
+            <a:schemeClr val="tx1"/>
+          </a:fontRef>
+        </p:style>
+      </p:cxnSp>
+      <p:sp>
+        <p:nvSpPr>
+          <p:cNvPr id="88" name="Rectangle: Rounded Corners 87">
+            <a:extLst>
+              <a:ext uri="{FF2B5EF4-FFF2-40B4-BE49-F238E27FC236}">
+                <a16:creationId xmlns:a16="http://schemas.microsoft.com/office/drawing/2014/main" id="{8E611BB6-79E5-46CB-8873-940F8411C7CC}"/>
+              </a:ext>
+            </a:extLst>
+          </p:cNvPr>
+          <p:cNvSpPr/>
+          <p:nvPr/>
+        </p:nvSpPr>
+        <p:spPr>
+          <a:xfrm>
+            <a:off x="4873615" y="2393302"/>
+            <a:ext cx="810971" cy="539824"/>
+          </a:xfrm>
+          <a:prstGeom prst="roundRect">
+            <a:avLst/>
+          </a:prstGeom>
+        </p:spPr>
+        <p:style>
+          <a:lnRef idx="2">
+            <a:schemeClr val="accent4">
+              <a:shade val="50000"/>
+            </a:schemeClr>
+          </a:lnRef>
+          <a:fillRef idx="1">
+            <a:schemeClr val="accent4"/>
+          </a:fillRef>
+          <a:effectRef idx="0">
+            <a:schemeClr val="accent4"/>
+          </a:effectRef>
+          <a:fontRef idx="minor">
+            <a:schemeClr val="lt1"/>
+          </a:fontRef>
+        </p:style>
+        <p:txBody>
+          <a:bodyPr rtlCol="0" anchor="ctr"/>
+          <a:lstStyle/>
+          <a:p>
+            <a:pPr algn="ctr"/>
+            <a:r>
+              <a:rPr lang="en-GB" sz="725" b="1" dirty="0"/>
+              <a:t>Ethics and Legal Advisory Board</a:t>
+            </a:r>
+          </a:p>
+        </p:txBody>
+      </p:sp>
+      <p:sp>
+        <p:nvSpPr>
+          <p:cNvPr id="90" name="Rectangle: Rounded Corners 89">
+            <a:extLst>
+              <a:ext uri="{FF2B5EF4-FFF2-40B4-BE49-F238E27FC236}">
+                <a16:creationId xmlns:a16="http://schemas.microsoft.com/office/drawing/2014/main" id="{A009B789-15CE-4388-90D3-6731F031B693}"/>
+              </a:ext>
+            </a:extLst>
+          </p:cNvPr>
+          <p:cNvSpPr/>
+          <p:nvPr/>
+        </p:nvSpPr>
+        <p:spPr>
+          <a:xfrm>
+            <a:off x="6313078" y="6360190"/>
+            <a:ext cx="1044240" cy="381376"/>
+          </a:xfrm>
+          <a:prstGeom prst="roundRect">
+            <a:avLst/>
+          </a:prstGeom>
+        </p:spPr>
+        <p:style>
+          <a:lnRef idx="2">
+            <a:schemeClr val="accent4">
+              <a:shade val="50000"/>
+            </a:schemeClr>
+          </a:lnRef>
+          <a:fillRef idx="1">
+            <a:schemeClr val="accent4"/>
+          </a:fillRef>
+          <a:effectRef idx="0">
+            <a:schemeClr val="accent4"/>
+          </a:effectRef>
+          <a:fontRef idx="minor">
+            <a:schemeClr val="lt1"/>
+          </a:fontRef>
+        </p:style>
+        <p:txBody>
+          <a:bodyPr rtlCol="0" anchor="ctr"/>
+          <a:lstStyle/>
+          <a:p>
+            <a:pPr algn="ctr"/>
+            <a:r>
+              <a:rPr lang="en-GB" sz="604" b="1" dirty="0"/>
+              <a:t>Research Community Working Groups</a:t>
+            </a:r>
+          </a:p>
+        </p:txBody>
+      </p:sp>
+      <p:sp>
+        <p:nvSpPr>
+          <p:cNvPr id="104" name="Rectangle: Rounded Corners 103">
+            <a:extLst>
+              <a:ext uri="{FF2B5EF4-FFF2-40B4-BE49-F238E27FC236}">
+                <a16:creationId xmlns:a16="http://schemas.microsoft.com/office/drawing/2014/main" id="{40FF49BF-8321-4D34-8861-11D551E59B8F}"/>
+              </a:ext>
+            </a:extLst>
+          </p:cNvPr>
+          <p:cNvSpPr/>
+          <p:nvPr/>
+        </p:nvSpPr>
+        <p:spPr>
+          <a:xfrm>
+            <a:off x="6359107" y="6406219"/>
+            <a:ext cx="1044240" cy="381376"/>
+          </a:xfrm>
+          <a:prstGeom prst="roundRect">
+            <a:avLst/>
+          </a:prstGeom>
+        </p:spPr>
+        <p:style>
+          <a:lnRef idx="2">
+            <a:schemeClr val="accent4">
+              <a:shade val="50000"/>
+            </a:schemeClr>
+          </a:lnRef>
+          <a:fillRef idx="1">
+            <a:schemeClr val="accent4"/>
+          </a:fillRef>
+          <a:effectRef idx="0">
+            <a:schemeClr val="accent4"/>
+          </a:effectRef>
+          <a:fontRef idx="minor">
+            <a:schemeClr val="lt1"/>
+          </a:fontRef>
+        </p:style>
+        <p:txBody>
+          <a:bodyPr rtlCol="0" anchor="ctr"/>
+          <a:lstStyle/>
+          <a:p>
+            <a:pPr algn="ctr"/>
+            <a:r>
+              <a:rPr lang="en-GB" sz="604" b="1" dirty="0"/>
+              <a:t>Research Community Working Groups</a:t>
+            </a:r>
+          </a:p>
+        </p:txBody>
+      </p:sp>
+      <p:sp>
+        <p:nvSpPr>
+          <p:cNvPr id="106" name="Rectangle: Rounded Corners 105">
+            <a:extLst>
+              <a:ext uri="{FF2B5EF4-FFF2-40B4-BE49-F238E27FC236}">
+                <a16:creationId xmlns:a16="http://schemas.microsoft.com/office/drawing/2014/main" id="{696E0F5B-41BB-4D59-8A74-CD19F7B52AEB}"/>
+              </a:ext>
+            </a:extLst>
+          </p:cNvPr>
+          <p:cNvSpPr/>
+          <p:nvPr/>
+        </p:nvSpPr>
+        <p:spPr>
+          <a:xfrm>
+            <a:off x="6405136" y="6439743"/>
+            <a:ext cx="1044240" cy="381376"/>
+          </a:xfrm>
+          <a:prstGeom prst="roundRect">
+            <a:avLst/>
+          </a:prstGeom>
+        </p:spPr>
+        <p:style>
+          <a:lnRef idx="2">
+            <a:schemeClr val="accent4">
+              <a:shade val="50000"/>
+            </a:schemeClr>
+          </a:lnRef>
+          <a:fillRef idx="1">
+            <a:schemeClr val="accent4"/>
+          </a:fillRef>
+          <a:effectRef idx="0">
+            <a:schemeClr val="accent4"/>
+          </a:effectRef>
+          <a:fontRef idx="minor">
+            <a:schemeClr val="lt1"/>
+          </a:fontRef>
+        </p:style>
+        <p:txBody>
+          <a:bodyPr rtlCol="0" anchor="ctr"/>
+          <a:lstStyle/>
+          <a:p>
+            <a:pPr algn="ctr"/>
+            <a:r>
+              <a:rPr lang="en-GB" sz="725" b="1" dirty="0"/>
+              <a:t>Cross cutting Working Groups</a:t>
+            </a:r>
+          </a:p>
+        </p:txBody>
+      </p:sp>
+      <p:cxnSp>
+        <p:nvCxnSpPr>
+          <p:cNvPr id="107" name="Straight Connector 106">
+            <a:extLst>
+              <a:ext uri="{FF2B5EF4-FFF2-40B4-BE49-F238E27FC236}">
+                <a16:creationId xmlns:a16="http://schemas.microsoft.com/office/drawing/2014/main" id="{2DD48E45-3E74-451F-9099-8B63BBA884F7}"/>
+              </a:ext>
+            </a:extLst>
+          </p:cNvPr>
+          <p:cNvCxnSpPr>
+            <a:cxnSpLocks/>
+            <a:stCxn id="95" idx="2"/>
+            <a:endCxn id="62" idx="0"/>
+          </p:cNvCxnSpPr>
+          <p:nvPr/>
+        </p:nvCxnSpPr>
+        <p:spPr>
+          <a:xfrm flipH="1">
+            <a:off x="2160878" y="3995876"/>
+            <a:ext cx="6237" cy="441798"/>
+          </a:xfrm>
+          <a:prstGeom prst="line">
+            <a:avLst/>
+          </a:prstGeom>
+          <a:ln w="25400">
+            <a:solidFill>
+              <a:schemeClr val="tx2"/>
+            </a:solidFill>
+          </a:ln>
+        </p:spPr>
+        <p:style>
+          <a:lnRef idx="1">
+            <a:schemeClr val="accent1"/>
+          </a:lnRef>
+          <a:fillRef idx="0">
+            <a:schemeClr val="accent1"/>
+          </a:fillRef>
+          <a:effectRef idx="0">
+            <a:schemeClr val="accent1"/>
+          </a:effectRef>
+          <a:fontRef idx="minor">
+            <a:schemeClr val="tx1"/>
+          </a:fontRef>
+        </p:style>
+      </p:cxnSp>
+      <p:cxnSp>
+        <p:nvCxnSpPr>
+          <p:cNvPr id="13" name="Straight Connector 12">
+            <a:extLst>
+              <a:ext uri="{FF2B5EF4-FFF2-40B4-BE49-F238E27FC236}">
+                <a16:creationId xmlns:a16="http://schemas.microsoft.com/office/drawing/2014/main" id="{507C2FC2-8527-4E20-BEE2-D92FE96A1200}"/>
+              </a:ext>
+            </a:extLst>
+          </p:cNvPr>
+          <p:cNvCxnSpPr>
+            <a:cxnSpLocks/>
+          </p:cNvCxnSpPr>
+          <p:nvPr/>
+        </p:nvCxnSpPr>
+        <p:spPr>
+          <a:xfrm>
+            <a:off x="1554480" y="3327812"/>
+            <a:ext cx="0" cy="3078407"/>
+          </a:xfrm>
+          <a:prstGeom prst="line">
+            <a:avLst/>
+          </a:prstGeom>
+          <a:ln w="22225">
+            <a:prstDash val="dash"/>
+          </a:ln>
+        </p:spPr>
+        <p:style>
+          <a:lnRef idx="1">
+            <a:schemeClr val="accent1"/>
+          </a:lnRef>
+          <a:fillRef idx="0">
+            <a:schemeClr val="accent1"/>
+          </a:fillRef>
+          <a:effectRef idx="0">
+            <a:schemeClr val="accent1"/>
+          </a:effectRef>
+          <a:fontRef idx="minor">
+            <a:schemeClr val="tx1"/>
+          </a:fontRef>
+        </p:style>
+      </p:cxnSp>
+      <p:cxnSp>
+        <p:nvCxnSpPr>
+          <p:cNvPr id="109" name="Straight Connector 108">
+            <a:extLst>
+              <a:ext uri="{FF2B5EF4-FFF2-40B4-BE49-F238E27FC236}">
+                <a16:creationId xmlns:a16="http://schemas.microsoft.com/office/drawing/2014/main" id="{7C122FA3-4A2A-40FB-BD3C-3A0A2EB9DA27}"/>
+              </a:ext>
+            </a:extLst>
+          </p:cNvPr>
+          <p:cNvCxnSpPr>
+            <a:cxnSpLocks/>
+          </p:cNvCxnSpPr>
+          <p:nvPr/>
+        </p:nvCxnSpPr>
+        <p:spPr>
+          <a:xfrm>
+            <a:off x="2749617" y="3313173"/>
+            <a:ext cx="0" cy="3078407"/>
+          </a:xfrm>
+          <a:prstGeom prst="line">
+            <a:avLst/>
+          </a:prstGeom>
+          <a:ln w="22225">
+            <a:prstDash val="dash"/>
+          </a:ln>
+        </p:spPr>
+        <p:style>
+          <a:lnRef idx="1">
+            <a:schemeClr val="accent1"/>
+          </a:lnRef>
+          <a:fillRef idx="0">
+            <a:schemeClr val="accent1"/>
+          </a:fillRef>
+          <a:effectRef idx="0">
+            <a:schemeClr val="accent1"/>
+          </a:effectRef>
+          <a:fontRef idx="minor">
+            <a:schemeClr val="tx1"/>
+          </a:fontRef>
+        </p:style>
+      </p:cxnSp>
+      <p:cxnSp>
+        <p:nvCxnSpPr>
+          <p:cNvPr id="110" name="Straight Connector 109">
+            <a:extLst>
+              <a:ext uri="{FF2B5EF4-FFF2-40B4-BE49-F238E27FC236}">
+                <a16:creationId xmlns:a16="http://schemas.microsoft.com/office/drawing/2014/main" id="{D5C8673C-18CD-49C2-83F1-B54C574EAFBD}"/>
+              </a:ext>
+            </a:extLst>
+          </p:cNvPr>
+          <p:cNvCxnSpPr>
+            <a:cxnSpLocks/>
+          </p:cNvCxnSpPr>
+          <p:nvPr/>
+        </p:nvCxnSpPr>
+        <p:spPr>
+          <a:xfrm>
+            <a:off x="6313078" y="3137010"/>
+            <a:ext cx="0" cy="3078407"/>
+          </a:xfrm>
+          <a:prstGeom prst="line">
+            <a:avLst/>
+          </a:prstGeom>
+          <a:ln w="22225">
+            <a:prstDash val="dash"/>
+          </a:ln>
+        </p:spPr>
+        <p:style>
+          <a:lnRef idx="1">
+            <a:schemeClr val="accent4"/>
+          </a:lnRef>
+          <a:fillRef idx="0">
+            <a:schemeClr val="accent4"/>
+          </a:fillRef>
+          <a:effectRef idx="0">
+            <a:schemeClr val="accent4"/>
+          </a:effectRef>
+          <a:fontRef idx="minor">
+            <a:schemeClr val="tx1"/>
+          </a:fontRef>
+        </p:style>
+      </p:cxnSp>
+      <p:cxnSp>
+        <p:nvCxnSpPr>
+          <p:cNvPr id="111" name="Straight Connector 110">
+            <a:extLst>
+              <a:ext uri="{FF2B5EF4-FFF2-40B4-BE49-F238E27FC236}">
+                <a16:creationId xmlns:a16="http://schemas.microsoft.com/office/drawing/2014/main" id="{32C8945A-1E43-4DEE-9EC0-78F164E41399}"/>
+              </a:ext>
+            </a:extLst>
+          </p:cNvPr>
+          <p:cNvCxnSpPr>
+            <a:cxnSpLocks/>
+          </p:cNvCxnSpPr>
+          <p:nvPr/>
+        </p:nvCxnSpPr>
+        <p:spPr>
+          <a:xfrm>
+            <a:off x="7701046" y="3149155"/>
+            <a:ext cx="0" cy="3078407"/>
+          </a:xfrm>
+          <a:prstGeom prst="line">
+            <a:avLst/>
+          </a:prstGeom>
+          <a:ln w="22225">
+            <a:prstDash val="dash"/>
+          </a:ln>
+        </p:spPr>
+        <p:style>
+          <a:lnRef idx="1">
+            <a:schemeClr val="accent4"/>
+          </a:lnRef>
+          <a:fillRef idx="0">
+            <a:schemeClr val="accent4"/>
+          </a:fillRef>
+          <a:effectRef idx="0">
+            <a:schemeClr val="accent4"/>
+          </a:effectRef>
+          <a:fontRef idx="minor">
+            <a:schemeClr val="tx1"/>
+          </a:fontRef>
+        </p:style>
+      </p:cxnSp>
+      <p:sp>
+        <p:nvSpPr>
+          <p:cNvPr id="15" name="TextBox 14">
+            <a:extLst>
+              <a:ext uri="{FF2B5EF4-FFF2-40B4-BE49-F238E27FC236}">
+                <a16:creationId xmlns:a16="http://schemas.microsoft.com/office/drawing/2014/main" id="{2E5E56E8-286D-4CEE-9824-1F34C5A4124B}"/>
+              </a:ext>
+            </a:extLst>
+          </p:cNvPr>
+          <p:cNvSpPr txBox="1"/>
+          <p:nvPr/>
+        </p:nvSpPr>
+        <p:spPr>
+          <a:xfrm>
+            <a:off x="320114" y="5969843"/>
+            <a:ext cx="1059906" cy="338554"/>
+          </a:xfrm>
+          <a:prstGeom prst="rect">
+            <a:avLst/>
+          </a:prstGeom>
+          <a:noFill/>
+        </p:spPr>
+        <p:txBody>
+          <a:bodyPr wrap="none" rtlCol="0">
+            <a:spAutoFit/>
+          </a:bodyPr>
+          <a:lstStyle/>
+          <a:p>
+            <a:pPr algn="ctr"/>
+            <a:r>
+              <a:rPr lang="en-GB" sz="800" dirty="0">
+                <a:solidFill>
+                  <a:schemeClr val="bg1"/>
+                </a:solidFill>
+              </a:rPr>
+              <a:t>Technical + Semantic</a:t>
+            </a:r>
+          </a:p>
+          <a:p>
+            <a:pPr algn="ctr"/>
+            <a:r>
+              <a:rPr lang="en-GB" sz="800" dirty="0">
+                <a:solidFill>
+                  <a:schemeClr val="bg1"/>
+                </a:solidFill>
+              </a:rPr>
+              <a:t>Pillar</a:t>
+            </a:r>
+          </a:p>
+        </p:txBody>
+      </p:sp>
+      <p:sp>
+        <p:nvSpPr>
+          <p:cNvPr id="118" name="TextBox 117">
+            <a:extLst>
+              <a:ext uri="{FF2B5EF4-FFF2-40B4-BE49-F238E27FC236}">
+                <a16:creationId xmlns:a16="http://schemas.microsoft.com/office/drawing/2014/main" id="{DB5424B9-CB74-4166-902E-20A3A10E3F1F}"/>
+              </a:ext>
+            </a:extLst>
+          </p:cNvPr>
+          <p:cNvSpPr txBox="1"/>
+          <p:nvPr/>
+        </p:nvSpPr>
+        <p:spPr>
+          <a:xfrm>
+            <a:off x="1532708" y="5971340"/>
+            <a:ext cx="1274708" cy="338554"/>
+          </a:xfrm>
+          <a:prstGeom prst="rect">
+            <a:avLst/>
+          </a:prstGeom>
+          <a:noFill/>
+        </p:spPr>
+        <p:txBody>
+          <a:bodyPr wrap="none" rtlCol="0">
+            <a:spAutoFit/>
+          </a:bodyPr>
+          <a:lstStyle/>
+          <a:p>
+            <a:pPr algn="ctr"/>
+            <a:r>
+              <a:rPr lang="en-GB" sz="800" dirty="0">
+                <a:solidFill>
+                  <a:schemeClr val="bg1"/>
+                </a:solidFill>
+              </a:rPr>
+              <a:t>Organisational + Semantic</a:t>
+            </a:r>
+          </a:p>
+          <a:p>
+            <a:pPr algn="ctr"/>
+            <a:r>
+              <a:rPr lang="en-GB" sz="800" dirty="0">
+                <a:solidFill>
+                  <a:schemeClr val="bg1"/>
+                </a:solidFill>
+              </a:rPr>
+              <a:t>Pillar</a:t>
+            </a:r>
+          </a:p>
+        </p:txBody>
+      </p:sp>
+      <p:sp>
+        <p:nvSpPr>
+          <p:cNvPr id="119" name="TextBox 118">
+            <a:extLst>
+              <a:ext uri="{FF2B5EF4-FFF2-40B4-BE49-F238E27FC236}">
+                <a16:creationId xmlns:a16="http://schemas.microsoft.com/office/drawing/2014/main" id="{978E17B1-CE81-4FA8-9EA0-BCC2DA278B6B}"/>
+              </a:ext>
+            </a:extLst>
+          </p:cNvPr>
+          <p:cNvSpPr txBox="1"/>
+          <p:nvPr/>
+        </p:nvSpPr>
+        <p:spPr>
+          <a:xfrm>
+            <a:off x="2818253" y="5971340"/>
+            <a:ext cx="881973" cy="338554"/>
+          </a:xfrm>
+          <a:prstGeom prst="rect">
+            <a:avLst/>
+          </a:prstGeom>
+          <a:noFill/>
+        </p:spPr>
+        <p:txBody>
+          <a:bodyPr wrap="none" rtlCol="0">
+            <a:spAutoFit/>
+          </a:bodyPr>
+          <a:lstStyle/>
+          <a:p>
+            <a:pPr algn="ctr"/>
+            <a:r>
+              <a:rPr lang="en-GB" sz="800" dirty="0">
+                <a:solidFill>
+                  <a:schemeClr val="bg1"/>
+                </a:solidFill>
+              </a:rPr>
+              <a:t>Legal + Semantic</a:t>
+            </a:r>
+          </a:p>
+          <a:p>
+            <a:pPr algn="ctr"/>
+            <a:r>
+              <a:rPr lang="en-GB" sz="800" dirty="0">
+                <a:solidFill>
+                  <a:schemeClr val="bg1"/>
+                </a:solidFill>
+              </a:rPr>
+              <a:t>Pillar</a:t>
+            </a:r>
+          </a:p>
+        </p:txBody>
+      </p:sp>
+      <p:sp>
+        <p:nvSpPr>
+          <p:cNvPr id="120" name="TextBox 119">
+            <a:extLst>
+              <a:ext uri="{FF2B5EF4-FFF2-40B4-BE49-F238E27FC236}">
+                <a16:creationId xmlns:a16="http://schemas.microsoft.com/office/drawing/2014/main" id="{0A02C508-A22C-41EB-8D47-BE0966008999}"/>
+              </a:ext>
+            </a:extLst>
+          </p:cNvPr>
+          <p:cNvSpPr txBox="1"/>
+          <p:nvPr/>
+        </p:nvSpPr>
+        <p:spPr>
+          <a:xfrm>
+            <a:off x="5308087" y="5881644"/>
+            <a:ext cx="601447" cy="338554"/>
+          </a:xfrm>
+          <a:prstGeom prst="rect">
+            <a:avLst/>
+          </a:prstGeom>
+          <a:noFill/>
+        </p:spPr>
+        <p:txBody>
+          <a:bodyPr wrap="none" rtlCol="0">
+            <a:spAutoFit/>
+          </a:bodyPr>
+          <a:lstStyle/>
+          <a:p>
+            <a:r>
+              <a:rPr lang="en-GB" sz="800" dirty="0">
+                <a:solidFill>
+                  <a:schemeClr val="bg1"/>
+                </a:solidFill>
+              </a:rPr>
+              <a:t>Technical</a:t>
+            </a:r>
+          </a:p>
+          <a:p>
+            <a:pPr algn="ctr"/>
+            <a:r>
+              <a:rPr lang="en-GB" sz="800" dirty="0">
+                <a:solidFill>
+                  <a:schemeClr val="bg1"/>
+                </a:solidFill>
+              </a:rPr>
+              <a:t>Pillar</a:t>
+            </a:r>
+          </a:p>
+        </p:txBody>
+      </p:sp>
+      <p:sp>
+        <p:nvSpPr>
+          <p:cNvPr id="121" name="TextBox 120">
+            <a:extLst>
+              <a:ext uri="{FF2B5EF4-FFF2-40B4-BE49-F238E27FC236}">
+                <a16:creationId xmlns:a16="http://schemas.microsoft.com/office/drawing/2014/main" id="{37B17C3E-F363-438B-BD55-E2188671E891}"/>
+              </a:ext>
+            </a:extLst>
+          </p:cNvPr>
+          <p:cNvSpPr txBox="1"/>
+          <p:nvPr/>
+        </p:nvSpPr>
+        <p:spPr>
+          <a:xfrm>
+            <a:off x="6568904" y="5905589"/>
+            <a:ext cx="816249" cy="338554"/>
+          </a:xfrm>
+          <a:prstGeom prst="rect">
+            <a:avLst/>
+          </a:prstGeom>
+          <a:noFill/>
+        </p:spPr>
+        <p:txBody>
+          <a:bodyPr wrap="none" rtlCol="0">
+            <a:spAutoFit/>
+          </a:bodyPr>
+          <a:lstStyle/>
+          <a:p>
+            <a:r>
+              <a:rPr lang="en-GB" sz="800" dirty="0">
+                <a:solidFill>
+                  <a:schemeClr val="bg1"/>
+                </a:solidFill>
+              </a:rPr>
+              <a:t>Organisational</a:t>
+            </a:r>
+          </a:p>
+          <a:p>
+            <a:pPr algn="ctr"/>
+            <a:r>
+              <a:rPr lang="en-GB" sz="800" dirty="0">
+                <a:solidFill>
+                  <a:schemeClr val="bg1"/>
+                </a:solidFill>
+              </a:rPr>
+              <a:t>Pillar</a:t>
+            </a:r>
+          </a:p>
+        </p:txBody>
+      </p:sp>
+      <p:sp>
+        <p:nvSpPr>
+          <p:cNvPr id="122" name="TextBox 121">
+            <a:extLst>
+              <a:ext uri="{FF2B5EF4-FFF2-40B4-BE49-F238E27FC236}">
+                <a16:creationId xmlns:a16="http://schemas.microsoft.com/office/drawing/2014/main" id="{4271C1AE-8CC8-4317-AF9B-B78225E5538F}"/>
+              </a:ext>
+            </a:extLst>
+          </p:cNvPr>
+          <p:cNvSpPr txBox="1"/>
+          <p:nvPr/>
+        </p:nvSpPr>
+        <p:spPr>
+          <a:xfrm>
+            <a:off x="8098267" y="5912817"/>
+            <a:ext cx="423514" cy="338554"/>
+          </a:xfrm>
+          <a:prstGeom prst="rect">
+            <a:avLst/>
+          </a:prstGeom>
+          <a:noFill/>
+        </p:spPr>
+        <p:txBody>
+          <a:bodyPr wrap="none" rtlCol="0">
+            <a:spAutoFit/>
+          </a:bodyPr>
+          <a:lstStyle/>
+          <a:p>
+            <a:pPr algn="ctr"/>
+            <a:r>
+              <a:rPr lang="en-GB" sz="800" dirty="0">
+                <a:solidFill>
+                  <a:schemeClr val="bg1"/>
+                </a:solidFill>
+              </a:rPr>
+              <a:t>Legal </a:t>
+            </a:r>
+          </a:p>
+          <a:p>
+            <a:pPr algn="ctr"/>
+            <a:r>
+              <a:rPr lang="en-GB" sz="800" dirty="0">
+                <a:solidFill>
+                  <a:schemeClr val="bg1"/>
+                </a:solidFill>
+              </a:rPr>
+              <a:t>Pillar</a:t>
             </a:r>
           </a:p>
         </p:txBody>
@@ -16062,36 +16781,6 @@
           <a:chExt cx="0" cy="0"/>
         </a:xfrm>
       </p:grpSpPr>
-      <p:pic>
-        <p:nvPicPr>
-          <p:cNvPr id="9" name="Picture 8">
-            <a:extLst>
-              <a:ext uri="{FF2B5EF4-FFF2-40B4-BE49-F238E27FC236}">
-                <a16:creationId xmlns:a16="http://schemas.microsoft.com/office/drawing/2014/main" id="{2B74F854-9567-4F4C-B2E5-2D0AE1FDC6AD}"/>
-              </a:ext>
-            </a:extLst>
-          </p:cNvPr>
-          <p:cNvPicPr>
-            <a:picLocks noChangeAspect="1"/>
-          </p:cNvPicPr>
-          <p:nvPr/>
-        </p:nvPicPr>
-        <p:blipFill>
-          <a:blip r:embed="rId2"/>
-          <a:stretch>
-            <a:fillRect/>
-          </a:stretch>
-        </p:blipFill>
-        <p:spPr>
-          <a:xfrm>
-            <a:off x="-292937" y="2298867"/>
-            <a:ext cx="4863664" cy="3271450"/>
-          </a:xfrm>
-          <a:prstGeom prst="rect">
-            <a:avLst/>
-          </a:prstGeom>
-        </p:spPr>
-      </p:pic>
       <p:sp>
         <p:nvSpPr>
           <p:cNvPr id="2" name="Title 1">
@@ -16119,31 +16808,6 @@
       </p:sp>
       <p:sp>
         <p:nvSpPr>
-          <p:cNvPr id="3" name="Content Placeholder 2">
-            <a:extLst>
-              <a:ext uri="{FF2B5EF4-FFF2-40B4-BE49-F238E27FC236}">
-                <a16:creationId xmlns:a16="http://schemas.microsoft.com/office/drawing/2014/main" id="{C530FE3C-C538-4AFD-90A4-52CAB17F2924}"/>
-              </a:ext>
-            </a:extLst>
-          </p:cNvPr>
-          <p:cNvSpPr>
-            <a:spLocks noGrp="1"/>
-          </p:cNvSpPr>
-          <p:nvPr>
-            <p:ph idx="1"/>
-          </p:nvPr>
-        </p:nvSpPr>
-        <p:spPr/>
-        <p:txBody>
-          <a:bodyPr/>
-          <a:lstStyle/>
-          <a:p>
-            <a:endParaRPr lang="en-GB" dirty="0"/>
-          </a:p>
-        </p:txBody>
-      </p:sp>
-      <p:sp>
-        <p:nvSpPr>
           <p:cNvPr id="4" name="Date Placeholder 3">
             <a:extLst>
               <a:ext uri="{FF2B5EF4-FFF2-40B4-BE49-F238E27FC236}">
@@ -16247,7 +16911,7 @@
         <p:spPr>
           <a:xfrm>
             <a:off x="178905" y="990350"/>
-            <a:ext cx="8448731" cy="712526"/>
+            <a:ext cx="8963193" cy="712526"/>
           </a:xfrm>
           <a:prstGeom prst="rect">
             <a:avLst/>
@@ -16255,7 +16919,7 @@
         </p:spPr>
         <p:txBody>
           <a:bodyPr vert="horz" lIns="91440" tIns="45720" rIns="91440" bIns="45720" rtlCol="0" anchor="ctr">
-            <a:normAutofit fontScale="67500" lnSpcReduction="20000"/>
+            <a:normAutofit fontScale="60000" lnSpcReduction="20000"/>
           </a:bodyPr>
           <a:lstStyle>
             <a:lvl1pPr algn="l" defTabSz="914400" rtl="0" eaLnBrk="1" latinLnBrk="0" hangingPunct="1">
@@ -16279,14 +16943,14 @@
           <a:p>
             <a:r>
               <a:rPr lang="fi-FI" dirty="0"/>
-              <a:t>EOSCpilot						             	       SWD</a:t>
+              <a:t>EOSCpilot						               EC Staff Working Document</a:t>
             </a:r>
             <a:br>
               <a:rPr lang="fi-FI" dirty="0"/>
             </a:br>
             <a:r>
               <a:rPr lang="fi-FI" dirty="0"/>
-              <a:t>post-2020				           		             up to 2020</a:t>
+              <a:t>post-2020				           		                           up to 2020</a:t>
             </a:r>
           </a:p>
         </p:txBody>
@@ -16375,7 +17039,7 @@
           <p:nvPr/>
         </p:nvPicPr>
         <p:blipFill>
-          <a:blip r:embed="rId3" r:link="rId4">
+          <a:blip r:embed="rId2" r:link="rId3">
             <a:extLst>
               <a:ext uri="{28A0092B-C50C-407E-A947-70E740481C1C}">
                 <a14:useLocalDpi xmlns:a14="http://schemas.microsoft.com/office/drawing/2010/main" val="0"/>
@@ -16422,9 +17086,9 @@
         <p:grpSpPr>
           <a:xfrm>
             <a:off x="-435154" y="3062932"/>
-            <a:ext cx="8590614" cy="2782594"/>
+            <a:ext cx="8590614" cy="2899172"/>
             <a:chOff x="-580205" y="2940909"/>
-            <a:chExt cx="11454151" cy="3710126"/>
+            <a:chExt cx="11454151" cy="3865564"/>
           </a:xfrm>
         </p:grpSpPr>
         <p:grpSp>
@@ -16558,7 +17222,7 @@
           </p:nvSpPr>
           <p:spPr>
             <a:xfrm>
-              <a:off x="5640609" y="6067808"/>
+              <a:off x="7613554" y="6314030"/>
               <a:ext cx="1760568" cy="492443"/>
             </a:xfrm>
             <a:prstGeom prst="rect">
@@ -16797,10 +17461,10 @@
         </p:nvGrpSpPr>
         <p:grpSpPr>
           <a:xfrm>
-            <a:off x="1843621" y="2411347"/>
-            <a:ext cx="7585056" cy="3447922"/>
-            <a:chOff x="2458162" y="2072129"/>
-            <a:chExt cx="10113407" cy="4597230"/>
+            <a:off x="2901688" y="2411347"/>
+            <a:ext cx="6526990" cy="3447922"/>
+            <a:chOff x="3868917" y="2072129"/>
+            <a:chExt cx="8702652" cy="4597230"/>
           </a:xfrm>
         </p:grpSpPr>
         <p:grpSp>
@@ -16942,7 +17606,7 @@
           </p:nvSpPr>
           <p:spPr>
             <a:xfrm>
-              <a:off x="2458162" y="6176916"/>
+              <a:off x="4526235" y="6176916"/>
               <a:ext cx="1552036" cy="492443"/>
             </a:xfrm>
             <a:prstGeom prst="rect">
@@ -16973,6 +17637,36 @@
           </p:txBody>
         </p:sp>
       </p:grpSp>
+      <p:pic>
+        <p:nvPicPr>
+          <p:cNvPr id="7" name="Picture 6">
+            <a:extLst>
+              <a:ext uri="{FF2B5EF4-FFF2-40B4-BE49-F238E27FC236}">
+                <a16:creationId xmlns:a16="http://schemas.microsoft.com/office/drawing/2014/main" id="{20612AD4-9D7B-4783-B45F-2B43C76D6DDE}"/>
+              </a:ext>
+            </a:extLst>
+          </p:cNvPr>
+          <p:cNvPicPr>
+            <a:picLocks noChangeAspect="1"/>
+          </p:cNvPicPr>
+          <p:nvPr/>
+        </p:nvPicPr>
+        <p:blipFill>
+          <a:blip r:embed="rId4"/>
+          <a:stretch>
+            <a:fillRect/>
+          </a:stretch>
+        </p:blipFill>
+        <p:spPr>
+          <a:xfrm>
+            <a:off x="-298857" y="2205874"/>
+            <a:ext cx="4882415" cy="3284063"/>
+          </a:xfrm>
+          <a:prstGeom prst="rect">
+            <a:avLst/>
+          </a:prstGeom>
+        </p:spPr>
+      </p:pic>
     </p:spTree>
     <p:extLst>
       <p:ext uri="{BB962C8B-B14F-4D97-AF65-F5344CB8AC3E}">
@@ -20205,9 +20899,7 @@
             <a:avLst/>
           </a:prstGeom>
           <a:solidFill>
-            <a:schemeClr val="accent5">
-              <a:lumMod val="75000"/>
-            </a:schemeClr>
+            <a:srgbClr val="507BC8"/>
           </a:solidFill>
         </p:spPr>
         <p:style>
@@ -20457,7 +21149,7 @@
           <a:p>
             <a:pPr algn="ctr"/>
             <a:r>
-              <a:rPr lang="en-GB" sz="1000" dirty="0">
+              <a:rPr lang="en-GB" sz="950" dirty="0">
                 <a:solidFill>
                   <a:schemeClr val="tx1"/>
                 </a:solidFill>
@@ -20468,7 +21160,7 @@
           <a:p>
             <a:pPr algn="ctr"/>
             <a:r>
-              <a:rPr lang="en-GB" sz="1000" dirty="0">
+              <a:rPr lang="en-GB" sz="950" dirty="0">
                 <a:solidFill>
                   <a:schemeClr val="tx1"/>
                 </a:solidFill>
@@ -20644,12 +21336,12 @@
           </a:fontRef>
         </p:style>
         <p:txBody>
-          <a:bodyPr rtlCol="0" anchor="ctr"/>
+          <a:bodyPr rtlCol="0" anchor="b"/>
           <a:lstStyle/>
           <a:p>
             <a:pPr algn="ctr"/>
             <a:r>
-              <a:rPr lang="en-GB" sz="1000" dirty="0">
+              <a:rPr lang="en-GB" sz="950" dirty="0">
                 <a:solidFill>
                   <a:schemeClr val="tx1"/>
                 </a:solidFill>
@@ -20691,10 +21383,10 @@
       </p:pic>
       <p:pic>
         <p:nvPicPr>
-          <p:cNvPr id="3" name="Picture 2">
+          <p:cNvPr id="2" name="Picture 1">
             <a:extLst>
               <a:ext uri="{FF2B5EF4-FFF2-40B4-BE49-F238E27FC236}">
-                <a16:creationId xmlns:a16="http://schemas.microsoft.com/office/drawing/2014/main" id="{11BE974B-59EB-4671-8A8E-898D01E10BD2}"/>
+                <a16:creationId xmlns:a16="http://schemas.microsoft.com/office/drawing/2014/main" id="{B96770A0-06F1-415E-B18F-05D7721959A9}"/>
               </a:ext>
             </a:extLst>
           </p:cNvPr>
@@ -20711,8 +21403,8 @@
         </p:blipFill>
         <p:spPr>
           <a:xfrm>
-            <a:off x="769382" y="4474647"/>
-            <a:ext cx="1687015" cy="1439621"/>
+            <a:off x="6532984" y="2252075"/>
+            <a:ext cx="2491233" cy="3086320"/>
           </a:xfrm>
           <a:prstGeom prst="rect">
             <a:avLst/>
@@ -20721,10 +21413,10 @@
       </p:pic>
       <p:pic>
         <p:nvPicPr>
-          <p:cNvPr id="5" name="Picture 4">
+          <p:cNvPr id="6" name="Picture 5">
             <a:extLst>
               <a:ext uri="{FF2B5EF4-FFF2-40B4-BE49-F238E27FC236}">
-                <a16:creationId xmlns:a16="http://schemas.microsoft.com/office/drawing/2014/main" id="{3B526556-6AD6-4681-A66D-361BB4E5B6A5}"/>
+                <a16:creationId xmlns:a16="http://schemas.microsoft.com/office/drawing/2014/main" id="{01293F0C-3673-40CF-9C56-8ABC33F661BB}"/>
               </a:ext>
             </a:extLst>
           </p:cNvPr>
@@ -20741,8 +21433,8 @@
         </p:blipFill>
         <p:spPr>
           <a:xfrm>
-            <a:off x="6516733" y="2480202"/>
-            <a:ext cx="2523735" cy="2569140"/>
+            <a:off x="943705" y="4461574"/>
+            <a:ext cx="1338369" cy="1508876"/>
           </a:xfrm>
           <a:prstGeom prst="rect">
             <a:avLst/>

</xml_diff>